<commit_message>
Updated for NWNUG talk, 2014-07-15.
</commit_message>
<xml_diff>
--- a/Asynchronous Parallel Reactive - HELP!/Asynchronous Parallel Reactive Help - 16.9.pptx
+++ b/Asynchronous Parallel Reactive - HELP!/Asynchronous Parallel Reactive Help - 16.9.pptx
@@ -7,7 +7,7 @@
     <p:sldMasterId id="2147483695" r:id="rId3"/>
   </p:sldMasterIdLst>
   <p:notesMasterIdLst>
-    <p:notesMasterId r:id="rId44"/>
+    <p:notesMasterId r:id="rId45"/>
   </p:notesMasterIdLst>
   <p:sldIdLst>
     <p:sldId id="256" r:id="rId4"/>
@@ -21,12 +21,12 @@
     <p:sldId id="355" r:id="rId12"/>
     <p:sldId id="356" r:id="rId13"/>
     <p:sldId id="357" r:id="rId14"/>
-    <p:sldId id="362" r:id="rId15"/>
-    <p:sldId id="348" r:id="rId16"/>
-    <p:sldId id="349" r:id="rId17"/>
-    <p:sldId id="360" r:id="rId18"/>
-    <p:sldId id="358" r:id="rId19"/>
-    <p:sldId id="359" r:id="rId20"/>
+    <p:sldId id="348" r:id="rId15"/>
+    <p:sldId id="349" r:id="rId16"/>
+    <p:sldId id="360" r:id="rId17"/>
+    <p:sldId id="358" r:id="rId18"/>
+    <p:sldId id="359" r:id="rId19"/>
+    <p:sldId id="381" r:id="rId20"/>
     <p:sldId id="350" r:id="rId21"/>
     <p:sldId id="351" r:id="rId22"/>
     <p:sldId id="368" r:id="rId23"/>
@@ -41,15 +41,16 @@
     <p:sldId id="374" r:id="rId32"/>
     <p:sldId id="376" r:id="rId33"/>
     <p:sldId id="377" r:id="rId34"/>
-    <p:sldId id="378" r:id="rId35"/>
-    <p:sldId id="379" r:id="rId36"/>
-    <p:sldId id="380" r:id="rId37"/>
-    <p:sldId id="363" r:id="rId38"/>
-    <p:sldId id="367" r:id="rId39"/>
-    <p:sldId id="375" r:id="rId40"/>
-    <p:sldId id="364" r:id="rId41"/>
-    <p:sldId id="365" r:id="rId42"/>
-    <p:sldId id="274" r:id="rId43"/>
+    <p:sldId id="362" r:id="rId35"/>
+    <p:sldId id="378" r:id="rId36"/>
+    <p:sldId id="379" r:id="rId37"/>
+    <p:sldId id="380" r:id="rId38"/>
+    <p:sldId id="363" r:id="rId39"/>
+    <p:sldId id="367" r:id="rId40"/>
+    <p:sldId id="375" r:id="rId41"/>
+    <p:sldId id="364" r:id="rId42"/>
+    <p:sldId id="365" r:id="rId43"/>
+    <p:sldId id="274" r:id="rId44"/>
   </p:sldIdLst>
   <p:sldSz cx="12192000" cy="6858000"/>
   <p:notesSz cx="6858000" cy="9144000"/>
@@ -164,12 +165,12 @@
             <p14:sldId id="355"/>
             <p14:sldId id="356"/>
             <p14:sldId id="357"/>
-            <p14:sldId id="362"/>
             <p14:sldId id="348"/>
             <p14:sldId id="349"/>
             <p14:sldId id="360"/>
             <p14:sldId id="358"/>
             <p14:sldId id="359"/>
+            <p14:sldId id="381"/>
             <p14:sldId id="350"/>
             <p14:sldId id="351"/>
             <p14:sldId id="368"/>
@@ -184,6 +185,7 @@
             <p14:sldId id="374"/>
             <p14:sldId id="376"/>
             <p14:sldId id="377"/>
+            <p14:sldId id="362"/>
             <p14:sldId id="378"/>
             <p14:sldId id="379"/>
             <p14:sldId id="380"/>
@@ -286,7 +288,7 @@
           <a:p>
             <a:fld id="{574E8BCA-0B4F-4373-B78E-3D2899449797}" type="datetimeFigureOut">
               <a:rPr lang="en-US" smtClean="0"/>
-              <a:t>3/20/2014</a:t>
+              <a:t>7/15/2014</a:t>
             </a:fld>
             <a:endParaRPr lang="en-US" dirty="0"/>
           </a:p>
@@ -688,82 +690,38 @@
           <a:p>
             <a:r>
               <a:rPr lang="en-US" dirty="0" smtClean="0"/>
-              <a:t>A</a:t>
+              <a:t>Asynchronous is</a:t>
             </a:r>
             <a:r>
               <a:rPr lang="en-US" baseline="0" dirty="0" smtClean="0"/>
-              <a:t> Task completes exactly once, either successfully (with result) or error.</a:t>
-            </a:r>
-          </a:p>
-          <a:p>
-            <a:endParaRPr lang="en-US" dirty="0" smtClean="0"/>
-          </a:p>
-          <a:p>
-            <a:r>
-              <a:rPr lang="en-US" dirty="0" smtClean="0"/>
-              <a:t>When await is passed an incomplete task, it pauses the current method’s execution and returns an incomplete task.</a:t>
-            </a:r>
-          </a:p>
-          <a:p>
-            <a:r>
-              <a:rPr lang="en-US" dirty="0" smtClean="0"/>
-              <a:t>Pauses the </a:t>
-            </a:r>
-            <a:r>
-              <a:rPr lang="en-US" i="1" dirty="0" smtClean="0"/>
-              <a:t>method</a:t>
-            </a:r>
-            <a:r>
-              <a:rPr lang="en-US" dirty="0" smtClean="0"/>
-              <a:t>,</a:t>
+              <a:t> a form of concurrency </a:t>
+            </a:r>
+            <a:r>
+              <a:rPr lang="en-US" i="1" baseline="0" dirty="0" smtClean="0"/>
+              <a:t>without</a:t>
             </a:r>
             <a:r>
               <a:rPr lang="en-US" baseline="0" dirty="0" smtClean="0"/>
-              <a:t> not the </a:t>
+              <a:t> using threads.</a:t>
+            </a:r>
+          </a:p>
+          <a:p>
+            <a:endParaRPr lang="en-US" baseline="0" dirty="0" smtClean="0"/>
+          </a:p>
+          <a:p>
+            <a:r>
+              <a:rPr lang="en-US" baseline="0" dirty="0" smtClean="0"/>
+              <a:t>Instead, asynchronous code registers a callback/future as a “bookmark” and </a:t>
             </a:r>
             <a:r>
               <a:rPr lang="en-US" i="1" baseline="0" dirty="0" smtClean="0"/>
-              <a:t>thread</a:t>
+              <a:t>frees</a:t>
             </a:r>
             <a:r>
               <a:rPr lang="en-US" baseline="0" dirty="0" smtClean="0"/>
-              <a:t>.</a:t>
-            </a:r>
-          </a:p>
-          <a:p>
-            <a:r>
-              <a:rPr lang="en-US" baseline="0" dirty="0" smtClean="0"/>
-              <a:t>Later, when the task argument completes, it resumes executing the method (by default, in the same context, or on the thread pool if no context).</a:t>
-            </a:r>
-          </a:p>
-          <a:p>
-            <a:endParaRPr lang="en-US" dirty="0" smtClean="0"/>
-          </a:p>
-          <a:p>
-            <a:r>
-              <a:rPr lang="en-US" dirty="0" err="1" smtClean="0"/>
-              <a:t>Async</a:t>
-            </a:r>
-            <a:r>
-              <a:rPr lang="en-US" dirty="0" smtClean="0"/>
-              <a:t> is about </a:t>
-            </a:r>
-            <a:r>
-              <a:rPr lang="en-US" i="1" dirty="0" smtClean="0"/>
-              <a:t>freeing up </a:t>
-            </a:r>
-            <a:r>
-              <a:rPr lang="en-US" dirty="0" smtClean="0"/>
-              <a:t>the current thread, not using </a:t>
-            </a:r>
-            <a:r>
-              <a:rPr lang="en-US" i="1" dirty="0" smtClean="0"/>
-              <a:t>background</a:t>
-            </a:r>
-            <a:r>
-              <a:rPr lang="en-US" dirty="0" smtClean="0"/>
-              <a:t> threads.</a:t>
-            </a:r>
+              <a:t> the current thread to do other work.</a:t>
+            </a:r>
+            <a:endParaRPr lang="en-US" dirty="0"/>
           </a:p>
         </p:txBody>
       </p:sp>
@@ -793,7 +751,7 @@
     </p:spTree>
     <p:extLst>
       <p:ext uri="{BB962C8B-B14F-4D97-AF65-F5344CB8AC3E}">
-        <p14:creationId xmlns:p14="http://schemas.microsoft.com/office/powerpoint/2010/main" val="3911491607"/>
+        <p14:creationId xmlns:p14="http://schemas.microsoft.com/office/powerpoint/2010/main" val="3197589142"/>
       </p:ext>
     </p:extLst>
   </p:cSld>
@@ -849,36 +807,44 @@
           <a:p>
             <a:r>
               <a:rPr lang="en-US" dirty="0" smtClean="0"/>
-              <a:t>Asynchronous is</a:t>
+              <a:t>This is the ideal I/O scenario for .NET I/O that uses the standard IOCP/OVERLAPPED system.</a:t>
+            </a:r>
+          </a:p>
+          <a:p>
+            <a:endParaRPr lang="en-US" dirty="0" smtClean="0"/>
+          </a:p>
+          <a:p>
+            <a:r>
+              <a:rPr lang="en-US" dirty="0" smtClean="0"/>
+              <a:t>IRP</a:t>
             </a:r>
             <a:r>
               <a:rPr lang="en-US" baseline="0" dirty="0" smtClean="0"/>
-              <a:t> a form of concurrency </a:t>
-            </a:r>
-            <a:r>
-              <a:rPr lang="en-US" i="1" baseline="0" dirty="0" smtClean="0"/>
-              <a:t>without</a:t>
-            </a:r>
+              <a:t> = I/O Request Packet</a:t>
+            </a:r>
+          </a:p>
+          <a:p>
             <a:r>
               <a:rPr lang="en-US" baseline="0" dirty="0" smtClean="0"/>
-              <a:t> using threads.</a:t>
-            </a:r>
-          </a:p>
-          <a:p>
-            <a:endParaRPr lang="en-US" baseline="0" dirty="0" smtClean="0"/>
+              <a:t>ISR = Interrupt Service Request</a:t>
+            </a:r>
           </a:p>
           <a:p>
             <a:r>
               <a:rPr lang="en-US" baseline="0" dirty="0" smtClean="0"/>
-              <a:t>Instead, asynchronous code registers a callback/future as a “bookmark” and </a:t>
-            </a:r>
-            <a:r>
-              <a:rPr lang="en-US" i="1" baseline="0" dirty="0" smtClean="0"/>
-              <a:t>frees</a:t>
-            </a:r>
+              <a:t>DPC = Deferred Procedure Call</a:t>
+            </a:r>
+          </a:p>
+          <a:p>
             <a:r>
               <a:rPr lang="en-US" baseline="0" dirty="0" smtClean="0"/>
-              <a:t> the current thread to do other work.</a:t>
+              <a:t>APC = Asynchronous Procedure Call</a:t>
+            </a:r>
+          </a:p>
+          <a:p>
+            <a:r>
+              <a:rPr lang="en-US" baseline="0" dirty="0" smtClean="0"/>
+              <a:t>IOCP = I/O Completion Port</a:t>
             </a:r>
             <a:endParaRPr lang="en-US" dirty="0"/>
           </a:p>
@@ -910,7 +876,7 @@
     </p:spTree>
     <p:extLst>
       <p:ext uri="{BB962C8B-B14F-4D97-AF65-F5344CB8AC3E}">
-        <p14:creationId xmlns:p14="http://schemas.microsoft.com/office/powerpoint/2010/main" val="3197589142"/>
+        <p14:creationId xmlns:p14="http://schemas.microsoft.com/office/powerpoint/2010/main" val="856237927"/>
       </p:ext>
     </p:extLst>
   </p:cSld>
@@ -966,44 +932,48 @@
           <a:p>
             <a:r>
               <a:rPr lang="en-US" dirty="0" smtClean="0"/>
-              <a:t>This is the ideal I/O scenario for .NET I/O that uses the standard IOCP/OVERLAPPED system.</a:t>
-            </a:r>
-          </a:p>
-          <a:p>
-            <a:endParaRPr lang="en-US" dirty="0" smtClean="0"/>
-          </a:p>
-          <a:p>
-            <a:r>
-              <a:rPr lang="en-US" dirty="0" smtClean="0"/>
-              <a:t>IRP</a:t>
+              <a:t>For TPL </a:t>
+            </a:r>
+            <a:r>
+              <a:rPr lang="en-US" dirty="0" err="1" smtClean="0"/>
+              <a:t>devs</a:t>
+            </a:r>
+            <a:r>
+              <a:rPr lang="en-US" dirty="0" smtClean="0"/>
+              <a:t>: Task (as used by the TPL)</a:t>
             </a:r>
             <a:r>
               <a:rPr lang="en-US" baseline="0" dirty="0" smtClean="0"/>
-              <a:t> = I/O Request Packet</a:t>
-            </a:r>
-          </a:p>
-          <a:p>
+              <a:t> is completely different than Task (as used by </a:t>
+            </a:r>
+            <a:r>
+              <a:rPr lang="en-US" baseline="0" dirty="0" err="1" smtClean="0"/>
+              <a:t>async</a:t>
+            </a:r>
             <a:r>
               <a:rPr lang="en-US" baseline="0" dirty="0" smtClean="0"/>
-              <a:t>ISR = Interrupt Service Request</a:t>
-            </a:r>
-          </a:p>
-          <a:p>
+              <a:t>).</a:t>
+            </a:r>
+          </a:p>
+          <a:p>
+            <a:endParaRPr lang="en-US" baseline="0" dirty="0" smtClean="0"/>
+          </a:p>
+          <a:p>
+            <a:r>
+              <a:rPr lang="en-US" dirty="0" smtClean="0"/>
+              <a:t>For newbie </a:t>
+            </a:r>
+            <a:r>
+              <a:rPr lang="en-US" dirty="0" err="1" smtClean="0"/>
+              <a:t>devs</a:t>
+            </a:r>
+            <a:r>
+              <a:rPr lang="en-US" dirty="0" smtClean="0"/>
+              <a:t>: Task has a lot of baggage</a:t>
+            </a:r>
             <a:r>
               <a:rPr lang="en-US" baseline="0" dirty="0" smtClean="0"/>
-              <a:t>DPC = Deferred Procedure Call</a:t>
-            </a:r>
-          </a:p>
-          <a:p>
-            <a:r>
-              <a:rPr lang="en-US" baseline="0" dirty="0" smtClean="0"/>
-              <a:t>APC = Asynchronous Procedure Call</a:t>
-            </a:r>
-          </a:p>
-          <a:p>
-            <a:r>
-              <a:rPr lang="en-US" baseline="0" dirty="0" smtClean="0"/>
-              <a:t>IOCP = I/O Completion Port</a:t>
+              <a:t> from the TPL; most members should just not be used.</a:t>
             </a:r>
             <a:endParaRPr lang="en-US" dirty="0"/>
           </a:p>
@@ -1035,7 +1005,7 @@
     </p:spTree>
     <p:extLst>
       <p:ext uri="{BB962C8B-B14F-4D97-AF65-F5344CB8AC3E}">
-        <p14:creationId xmlns:p14="http://schemas.microsoft.com/office/powerpoint/2010/main" val="856237927"/>
+        <p14:creationId xmlns:p14="http://schemas.microsoft.com/office/powerpoint/2010/main" val="2734589216"/>
       </p:ext>
     </p:extLst>
   </p:cSld>
@@ -1848,11 +1818,7 @@
             </a:r>
             <a:r>
               <a:rPr lang="en-US" i="1" dirty="0" smtClean="0"/>
-              <a:t>at the same </a:t>
-            </a:r>
-            <a:r>
-              <a:rPr lang="en-US" i="1" dirty="0" smtClean="0"/>
-              <a:t>time</a:t>
+              <a:t>at the same time</a:t>
             </a:r>
             <a:r>
               <a:rPr lang="en-US" i="0" baseline="0" dirty="0" smtClean="0"/>
@@ -1862,7 +1828,6 @@
               <a:rPr lang="en-US" dirty="0" smtClean="0"/>
               <a:t>.</a:t>
             </a:r>
-            <a:endParaRPr lang="en-US" dirty="0" smtClean="0"/>
           </a:p>
           <a:p>
             <a:pPr marL="171450" indent="-171450">
@@ -1930,11 +1895,7 @@
             </a:pPr>
             <a:r>
               <a:rPr lang="en-US" baseline="0" dirty="0" smtClean="0"/>
-              <a:t>Multithreading and Parallelism are colored red because you usually don’t want them on ASP.NET</a:t>
-            </a:r>
-            <a:r>
-              <a:rPr lang="en-US" baseline="0" dirty="0" smtClean="0"/>
-              <a:t>.</a:t>
+              <a:t>Multithreading and Parallelism are colored red because you usually don’t want them on ASP.NET.</a:t>
             </a:r>
             <a:br>
               <a:rPr lang="en-US" baseline="0" dirty="0" smtClean="0"/>
@@ -2366,7 +2327,45 @@
           <a:p>
             <a:r>
               <a:rPr lang="en-US" dirty="0" smtClean="0"/>
-              <a:t>The Rx Scheduler abstraction is used in unit testing.</a:t>
+              <a:t>Observables are what events really should be:</a:t>
+            </a:r>
+          </a:p>
+          <a:p>
+            <a:pPr marL="171450" indent="-171450">
+              <a:buFont typeface="Arial" panose="020B0604020202020204" pitchFamily="34" charset="0"/>
+              <a:buChar char="•"/>
+            </a:pPr>
+            <a:r>
+              <a:rPr lang="en-US" dirty="0" smtClean="0"/>
+              <a:t>Clean,</a:t>
+            </a:r>
+            <a:r>
+              <a:rPr lang="en-US" baseline="0" dirty="0" smtClean="0"/>
+              <a:t> disposable subscriptions.</a:t>
+            </a:r>
+          </a:p>
+          <a:p>
+            <a:pPr marL="171450" indent="-171450">
+              <a:buFont typeface="Arial" panose="020B0604020202020204" pitchFamily="34" charset="0"/>
+              <a:buChar char="•"/>
+            </a:pPr>
+            <a:r>
+              <a:rPr lang="en-US" baseline="0" dirty="0" smtClean="0"/>
+              <a:t>Well-defined threading semantics (e.g., no EBAP necessary) including shutdown semantics (unsolvable problem for raw events).</a:t>
+            </a:r>
+            <a:endParaRPr lang="en-US" dirty="0" smtClean="0"/>
+          </a:p>
+          <a:p>
+            <a:endParaRPr lang="en-US" dirty="0" smtClean="0"/>
+          </a:p>
+          <a:p>
+            <a:r>
+              <a:rPr lang="en-US" dirty="0" smtClean="0"/>
+              <a:t>The </a:t>
+            </a:r>
+            <a:r>
+              <a:rPr lang="en-US" dirty="0" smtClean="0"/>
+              <a:t>Rx Scheduler abstraction is used in unit testing.</a:t>
             </a:r>
           </a:p>
           <a:p>
@@ -2464,7 +2463,32 @@
           <a:p>
             <a:r>
               <a:rPr lang="en-US" dirty="0" smtClean="0"/>
-              <a:t>Throttle: When an incoming event arrives, it resets the timeout window. When the timeout window expires, it publishes the last event value that arrived within the window.</a:t>
+              <a:t>Rx </a:t>
+            </a:r>
+            <a:r>
+              <a:rPr lang="en-US" i="1" dirty="0" smtClean="0"/>
+              <a:t>really</a:t>
+            </a:r>
+            <a:r>
+              <a:rPr lang="en-US" dirty="0" smtClean="0"/>
+              <a:t> shines when it comes to </a:t>
+            </a:r>
+            <a:r>
+              <a:rPr lang="en-US" i="1" dirty="0" smtClean="0"/>
+              <a:t>time!</a:t>
+            </a:r>
+          </a:p>
+          <a:p>
+            <a:endParaRPr lang="en-US" dirty="0" smtClean="0"/>
+          </a:p>
+          <a:p>
+            <a:r>
+              <a:rPr lang="en-US" dirty="0" smtClean="0"/>
+              <a:t>Throttle</a:t>
+            </a:r>
+            <a:r>
+              <a:rPr lang="en-US" dirty="0" smtClean="0"/>
+              <a:t>: When an incoming event arrives, it resets the timeout window. When the timeout window expires, it publishes the last event value that arrived within the window.</a:t>
             </a:r>
           </a:p>
           <a:p>
@@ -2558,6 +2582,18 @@
           <a:bodyPr/>
           <a:lstStyle/>
           <a:p>
+            <a:r>
+              <a:rPr lang="en-US" dirty="0" err="1" smtClean="0"/>
+              <a:t>cKcP</a:t>
+            </a:r>
+            <a:r>
+              <a:rPr lang="en-US" dirty="0" smtClean="0"/>
+              <a:t>, </a:t>
+            </a:r>
+            <a:r>
+              <a:rPr lang="en-US" dirty="0" err="1" smtClean="0"/>
+              <a:t>cKcN</a:t>
+            </a:r>
             <a:endParaRPr lang="en-US" dirty="0"/>
           </a:p>
         </p:txBody>
@@ -2588,7 +2624,7 @@
     </p:spTree>
     <p:extLst>
       <p:ext uri="{BB962C8B-B14F-4D97-AF65-F5344CB8AC3E}">
-        <p14:creationId xmlns:p14="http://schemas.microsoft.com/office/powerpoint/2010/main" val="1696150676"/>
+        <p14:creationId xmlns:p14="http://schemas.microsoft.com/office/powerpoint/2010/main" val="491771487"/>
       </p:ext>
     </p:extLst>
   </p:cSld>
@@ -2642,64 +2678,7 @@
           <a:bodyPr/>
           <a:lstStyle/>
           <a:p>
-            <a:pPr marL="171450" indent="-171450">
-              <a:buFont typeface="Arial" panose="020B0604020202020204" pitchFamily="34" charset="0"/>
-              <a:buChar char="•"/>
-            </a:pPr>
-            <a:r>
-              <a:rPr lang="en-US" dirty="0" smtClean="0"/>
-              <a:t>Is it</a:t>
-            </a:r>
-            <a:r>
-              <a:rPr lang="en-US" baseline="0" dirty="0" smtClean="0"/>
-              <a:t> CPU-bound (vs. I/O-bound or blocking)? Yes: Parallel.</a:t>
-            </a:r>
-          </a:p>
-          <a:p>
-            <a:pPr marL="628650" lvl="1" indent="-171450">
-              <a:buFont typeface="Arial" panose="020B0604020202020204" pitchFamily="34" charset="0"/>
-              <a:buChar char="•"/>
-            </a:pPr>
-            <a:r>
-              <a:rPr lang="en-US" baseline="0" dirty="0" smtClean="0"/>
-              <a:t>Or, if you want to treat it </a:t>
-            </a:r>
-            <a:r>
-              <a:rPr lang="en-US" i="1" baseline="0" dirty="0" smtClean="0"/>
-              <a:t>as</a:t>
-            </a:r>
-            <a:r>
-              <a:rPr lang="en-US" baseline="0" dirty="0" smtClean="0"/>
-              <a:t> asynchronous, then wrap it in </a:t>
-            </a:r>
-            <a:r>
-              <a:rPr lang="en-US" baseline="0" dirty="0" err="1" smtClean="0"/>
-              <a:t>Task.Run</a:t>
-            </a:r>
-            <a:r>
-              <a:rPr lang="en-US" baseline="0" dirty="0" smtClean="0"/>
-              <a:t>.</a:t>
-            </a:r>
-          </a:p>
-          <a:p>
-            <a:pPr marL="171450" indent="-171450">
-              <a:buFont typeface="Arial" panose="020B0604020202020204" pitchFamily="34" charset="0"/>
-              <a:buChar char="•"/>
-            </a:pPr>
-            <a:r>
-              <a:rPr lang="en-US" baseline="0" dirty="0" smtClean="0"/>
-              <a:t>Is it pull (start with completion) or push (subscribe and receive updates)? Pull: Asynchronous. Push: Reactive.</a:t>
-            </a:r>
-          </a:p>
-          <a:p>
-            <a:pPr marL="171450" indent="-171450">
-              <a:buFont typeface="Arial" panose="020B0604020202020204" pitchFamily="34" charset="0"/>
-              <a:buChar char="•"/>
-            </a:pPr>
-            <a:r>
-              <a:rPr lang="en-US" baseline="0" dirty="0" smtClean="0"/>
-              <a:t>Almost never do Multithreaded unless you’re doing Parallel.</a:t>
-            </a:r>
+            <a:endParaRPr lang="en-US" dirty="0"/>
           </a:p>
         </p:txBody>
       </p:sp>
@@ -2720,7 +2699,7 @@
           <a:p>
             <a:fld id="{94CE3395-F8FF-4336-B2AA-E15575B990E7}" type="slidenum">
               <a:rPr lang="en-US" smtClean="0"/>
-              <a:t>36</a:t>
+              <a:t>33</a:t>
             </a:fld>
             <a:endParaRPr lang="en-US" dirty="0"/>
           </a:p>
@@ -2729,7 +2708,7 @@
     </p:spTree>
     <p:extLst>
       <p:ext uri="{BB962C8B-B14F-4D97-AF65-F5344CB8AC3E}">
-        <p14:creationId xmlns:p14="http://schemas.microsoft.com/office/powerpoint/2010/main" val="3854500900"/>
+        <p14:creationId xmlns:p14="http://schemas.microsoft.com/office/powerpoint/2010/main" val="1696150676"/>
       </p:ext>
     </p:extLst>
   </p:cSld>
@@ -2783,24 +2762,61 @@
           <a:bodyPr/>
           <a:lstStyle/>
           <a:p>
-            <a:r>
-              <a:rPr lang="en-US" dirty="0" smtClean="0"/>
-              <a:t>The</a:t>
+            <a:pPr marL="171450" indent="-171450">
+              <a:buFont typeface="Arial" panose="020B0604020202020204" pitchFamily="34" charset="0"/>
+              <a:buChar char="•"/>
+            </a:pPr>
+            <a:r>
+              <a:rPr lang="en-US" dirty="0" smtClean="0"/>
+              <a:t>Is it</a:t>
             </a:r>
             <a:r>
               <a:rPr lang="en-US" baseline="0" dirty="0" smtClean="0"/>
-              <a:t> slides will be available for download tonight from my blog (blog.stephencleary.com).</a:t>
-            </a:r>
-          </a:p>
-          <a:p>
+              <a:t> CPU-bound (vs. I/O-bound or blocking)? Yes: </a:t>
+            </a:r>
+            <a:r>
+              <a:rPr lang="en-US" baseline="0" dirty="0" smtClean="0"/>
+              <a:t>Execute directly, </a:t>
+            </a:r>
+            <a:r>
+              <a:rPr lang="en-US" baseline="0" dirty="0" err="1" smtClean="0"/>
+              <a:t>Task.Run</a:t>
+            </a:r>
+            <a:r>
+              <a:rPr lang="en-US" baseline="0" dirty="0" smtClean="0"/>
+              <a:t>, or Parallel</a:t>
+            </a:r>
+            <a:r>
+              <a:rPr lang="en-US" baseline="0" dirty="0" smtClean="0"/>
+              <a:t>.</a:t>
+            </a:r>
+          </a:p>
+          <a:p>
+            <a:pPr marL="171450" indent="-171450">
+              <a:buFont typeface="Arial" panose="020B0604020202020204" pitchFamily="34" charset="0"/>
+              <a:buChar char="•"/>
+            </a:pPr>
+            <a:r>
+              <a:rPr lang="en-US" baseline="0" dirty="0" smtClean="0"/>
+              <a:t>Is </a:t>
+            </a:r>
+            <a:r>
+              <a:rPr lang="en-US" baseline="0" dirty="0" smtClean="0"/>
+              <a:t>it pull (start with </a:t>
+            </a:r>
+            <a:r>
+              <a:rPr lang="en-US" baseline="0" dirty="0" smtClean="0"/>
+              <a:t>completion, single result) </a:t>
+            </a:r>
+            <a:r>
+              <a:rPr lang="en-US" baseline="0" dirty="0" smtClean="0"/>
+              <a:t>or push (subscribe and receive updates)? Pull: Asynchronous. Push: Reactive</a:t>
+            </a:r>
+            <a:r>
+              <a:rPr lang="en-US" baseline="0" dirty="0" smtClean="0"/>
+              <a:t>.</a:t>
+            </a:r>
             <a:endParaRPr lang="en-US" baseline="0" dirty="0" smtClean="0"/>
-          </a:p>
-          <a:p>
-            <a:r>
-              <a:rPr lang="en-US" baseline="0" dirty="0" smtClean="0"/>
-              <a:t>Samples download includes both examples from my Parallel demo.</a:t>
-            </a:r>
-            <a:endParaRPr lang="en-US" dirty="0"/>
           </a:p>
         </p:txBody>
       </p:sp>
@@ -2821,7 +2837,7 @@
           <a:p>
             <a:fld id="{94CE3395-F8FF-4336-B2AA-E15575B990E7}" type="slidenum">
               <a:rPr lang="en-US" smtClean="0"/>
-              <a:t>38</a:t>
+              <a:t>37</a:t>
             </a:fld>
             <a:endParaRPr lang="en-US" dirty="0"/>
           </a:p>
@@ -2830,7 +2846,7 @@
     </p:spTree>
     <p:extLst>
       <p:ext uri="{BB962C8B-B14F-4D97-AF65-F5344CB8AC3E}">
-        <p14:creationId xmlns:p14="http://schemas.microsoft.com/office/powerpoint/2010/main" val="719321554"/>
+        <p14:creationId xmlns:p14="http://schemas.microsoft.com/office/powerpoint/2010/main" val="3854500900"/>
       </p:ext>
     </p:extLst>
   </p:cSld>
@@ -2886,15 +2902,20 @@
           <a:p>
             <a:r>
               <a:rPr lang="en-US" dirty="0" smtClean="0"/>
-              <a:t>My </a:t>
-            </a:r>
-            <a:r>
-              <a:rPr lang="en-US" dirty="0" err="1" smtClean="0"/>
-              <a:t>async</a:t>
-            </a:r>
-            <a:r>
-              <a:rPr lang="en-US" dirty="0" smtClean="0"/>
-              <a:t> intro contains links to other resources at the bottom.</a:t>
+              <a:t>The</a:t>
+            </a:r>
+            <a:r>
+              <a:rPr lang="en-US" baseline="0" dirty="0" smtClean="0"/>
+              <a:t> slides will be available for download tonight from my blog (blog.stephencleary.com).</a:t>
+            </a:r>
+          </a:p>
+          <a:p>
+            <a:endParaRPr lang="en-US" baseline="0" dirty="0" smtClean="0"/>
+          </a:p>
+          <a:p>
+            <a:r>
+              <a:rPr lang="en-US" baseline="0" dirty="0" smtClean="0"/>
+              <a:t>Samples download includes both examples from my Parallel demo.</a:t>
             </a:r>
             <a:endParaRPr lang="en-US" dirty="0"/>
           </a:p>
@@ -2926,7 +2947,7 @@
     </p:spTree>
     <p:extLst>
       <p:ext uri="{BB962C8B-B14F-4D97-AF65-F5344CB8AC3E}">
-        <p14:creationId xmlns:p14="http://schemas.microsoft.com/office/powerpoint/2010/main" val="2430811530"/>
+        <p14:creationId xmlns:p14="http://schemas.microsoft.com/office/powerpoint/2010/main" val="719321554"/>
       </p:ext>
     </p:extLst>
   </p:cSld>
@@ -2982,11 +3003,15 @@
           <a:p>
             <a:r>
               <a:rPr lang="en-US" dirty="0" smtClean="0"/>
-              <a:t>Resources are available</a:t>
-            </a:r>
-            <a:r>
-              <a:rPr lang="en-US" baseline="0" dirty="0" smtClean="0"/>
-              <a:t> at StephenCleary.com - slides, example code, etc.</a:t>
+              <a:t>My </a:t>
+            </a:r>
+            <a:r>
+              <a:rPr lang="en-US" dirty="0" err="1" smtClean="0"/>
+              <a:t>async</a:t>
+            </a:r>
+            <a:r>
+              <a:rPr lang="en-US" dirty="0" smtClean="0"/>
+              <a:t> intro contains links to other resources at the bottom.</a:t>
             </a:r>
             <a:endParaRPr lang="en-US" dirty="0"/>
           </a:p>
@@ -3018,7 +3043,7 @@
     </p:spTree>
     <p:extLst>
       <p:ext uri="{BB962C8B-B14F-4D97-AF65-F5344CB8AC3E}">
-        <p14:creationId xmlns:p14="http://schemas.microsoft.com/office/powerpoint/2010/main" val="1830998887"/>
+        <p14:creationId xmlns:p14="http://schemas.microsoft.com/office/powerpoint/2010/main" val="2430811530"/>
       </p:ext>
     </p:extLst>
   </p:cSld>
@@ -3144,7 +3169,24 @@
             </a:r>
             <a:r>
               <a:rPr lang="en-US" baseline="0" dirty="0" smtClean="0"/>
-              <a:t> need to.</a:t>
+              <a:t> need to</a:t>
+            </a:r>
+            <a:r>
+              <a:rPr lang="en-US" baseline="0" dirty="0" smtClean="0"/>
+              <a:t>.</a:t>
+            </a:r>
+          </a:p>
+          <a:p>
+            <a:endParaRPr lang="en-US" baseline="0" dirty="0" smtClean="0"/>
+          </a:p>
+          <a:p>
+            <a:r>
+              <a:rPr lang="en-US" baseline="0" dirty="0" err="1" smtClean="0"/>
+              <a:t>Task.Run</a:t>
+            </a:r>
+            <a:r>
+              <a:rPr lang="en-US" baseline="0" dirty="0" smtClean="0"/>
+              <a:t> – almost the only modern “multithreading” you need.</a:t>
             </a:r>
             <a:endParaRPr lang="en-US" dirty="0"/>
           </a:p>
@@ -3177,6 +3219,98 @@
     <p:extLst>
       <p:ext uri="{BB962C8B-B14F-4D97-AF65-F5344CB8AC3E}">
         <p14:creationId xmlns:p14="http://schemas.microsoft.com/office/powerpoint/2010/main" val="2659835034"/>
+      </p:ext>
+    </p:extLst>
+  </p:cSld>
+  <p:clrMapOvr>
+    <a:masterClrMapping/>
+  </p:clrMapOvr>
+</p:notes>
+</file>
+
+<file path=ppt/notesSlides/notesSlide30.xml><?xml version="1.0" encoding="utf-8"?>
+<p:notes xmlns:a="http://schemas.openxmlformats.org/drawingml/2006/main" xmlns:r="http://schemas.openxmlformats.org/officeDocument/2006/relationships" xmlns:p="http://schemas.openxmlformats.org/presentationml/2006/main">
+  <p:cSld>
+    <p:spTree>
+      <p:nvGrpSpPr>
+        <p:cNvPr id="1" name=""/>
+        <p:cNvGrpSpPr/>
+        <p:nvPr/>
+      </p:nvGrpSpPr>
+      <p:grpSpPr>
+        <a:xfrm>
+          <a:off x="0" y="0"/>
+          <a:ext cx="0" cy="0"/>
+          <a:chOff x="0" y="0"/>
+          <a:chExt cx="0" cy="0"/>
+        </a:xfrm>
+      </p:grpSpPr>
+      <p:sp>
+        <p:nvSpPr>
+          <p:cNvPr id="2" name="Slide Image Placeholder 1"/>
+          <p:cNvSpPr>
+            <a:spLocks noGrp="1" noRot="1" noChangeAspect="1"/>
+          </p:cNvSpPr>
+          <p:nvPr>
+            <p:ph type="sldImg"/>
+          </p:nvPr>
+        </p:nvSpPr>
+        <p:spPr/>
+      </p:sp>
+      <p:sp>
+        <p:nvSpPr>
+          <p:cNvPr id="3" name="Notes Placeholder 2"/>
+          <p:cNvSpPr>
+            <a:spLocks noGrp="1"/>
+          </p:cNvSpPr>
+          <p:nvPr>
+            <p:ph type="body" idx="1"/>
+          </p:nvPr>
+        </p:nvSpPr>
+        <p:spPr/>
+        <p:txBody>
+          <a:bodyPr/>
+          <a:lstStyle/>
+          <a:p>
+            <a:r>
+              <a:rPr lang="en-US" dirty="0" smtClean="0"/>
+              <a:t>Resources are available</a:t>
+            </a:r>
+            <a:r>
+              <a:rPr lang="en-US" baseline="0" dirty="0" smtClean="0"/>
+              <a:t> at StephenCleary.com - slides, example code, etc.</a:t>
+            </a:r>
+            <a:endParaRPr lang="en-US" dirty="0"/>
+          </a:p>
+        </p:txBody>
+      </p:sp>
+      <p:sp>
+        <p:nvSpPr>
+          <p:cNvPr id="4" name="Slide Number Placeholder 3"/>
+          <p:cNvSpPr>
+            <a:spLocks noGrp="1"/>
+          </p:cNvSpPr>
+          <p:nvPr>
+            <p:ph type="sldNum" sz="quarter" idx="10"/>
+          </p:nvPr>
+        </p:nvSpPr>
+        <p:spPr/>
+        <p:txBody>
+          <a:bodyPr/>
+          <a:lstStyle/>
+          <a:p>
+            <a:fld id="{94CE3395-F8FF-4336-B2AA-E15575B990E7}" type="slidenum">
+              <a:rPr lang="en-US" smtClean="0"/>
+              <a:t>41</a:t>
+            </a:fld>
+            <a:endParaRPr lang="en-US" dirty="0"/>
+          </a:p>
+        </p:txBody>
+      </p:sp>
+    </p:spTree>
+    <p:extLst>
+      <p:ext uri="{BB962C8B-B14F-4D97-AF65-F5344CB8AC3E}">
+        <p14:creationId xmlns:p14="http://schemas.microsoft.com/office/powerpoint/2010/main" val="1830998887"/>
       </p:ext>
     </p:extLst>
   </p:cSld>
@@ -3572,7 +3706,15 @@
             </a:r>
             <a:r>
               <a:rPr lang="en-US" dirty="0" smtClean="0"/>
-              <a:t> scenario where </a:t>
+              <a:t> </a:t>
+            </a:r>
+            <a:r>
+              <a:rPr lang="en-US" dirty="0" smtClean="0"/>
+              <a:t>modern scenario </a:t>
+            </a:r>
+            <a:r>
+              <a:rPr lang="en-US" dirty="0" smtClean="0"/>
+              <a:t>where </a:t>
             </a:r>
             <a:r>
               <a:rPr lang="en-US" baseline="0" dirty="0" err="1" smtClean="0"/>
@@ -3598,8 +3740,21 @@
             </a:r>
             <a:r>
               <a:rPr lang="en-US" baseline="0" dirty="0" smtClean="0"/>
-              <a:t> commonly misused on the Internet.</a:t>
-            </a:r>
+              <a:t> commonly misused on the </a:t>
+            </a:r>
+            <a:r>
+              <a:rPr lang="en-US" baseline="0" dirty="0" smtClean="0"/>
+              <a:t>Internet (most should use </a:t>
+            </a:r>
+            <a:r>
+              <a:rPr lang="en-US" baseline="0" dirty="0" err="1" smtClean="0"/>
+              <a:t>Task.Run</a:t>
+            </a:r>
+            <a:r>
+              <a:rPr lang="en-US" baseline="0" dirty="0" smtClean="0"/>
+              <a:t> instead).</a:t>
+            </a:r>
+            <a:endParaRPr lang="en-US" baseline="0" dirty="0" smtClean="0"/>
           </a:p>
           <a:p>
             <a:endParaRPr lang="en-US" baseline="0" dirty="0" smtClean="0"/>
@@ -3694,16 +3849,49 @@
           <a:lstStyle/>
           <a:p>
             <a:r>
+              <a:rPr lang="en-US" dirty="0" smtClean="0"/>
+              <a:t>Asynchronous processing is all the rage these days. </a:t>
+            </a:r>
+            <a:r>
               <a:rPr lang="en-US" dirty="0" err="1" smtClean="0"/>
-              <a:t>cKcP</a:t>
-            </a:r>
-            <a:r>
-              <a:rPr lang="en-US" dirty="0" smtClean="0"/>
-              <a:t>, </a:t>
-            </a:r>
+              <a:t>Async</a:t>
+            </a:r>
+            <a:r>
+              <a:rPr lang="en-US" dirty="0" smtClean="0"/>
+              <a:t>/await FTW</a:t>
+            </a:r>
+            <a:r>
+              <a:rPr lang="en-US" dirty="0" smtClean="0"/>
+              <a:t>!</a:t>
+            </a:r>
+          </a:p>
+          <a:p>
+            <a:endParaRPr lang="en-US" dirty="0" smtClean="0"/>
+          </a:p>
+          <a:p>
             <a:r>
               <a:rPr lang="en-US" dirty="0" err="1" smtClean="0"/>
-              <a:t>cKcN</a:t>
+              <a:t>Async</a:t>
+            </a:r>
+            <a:r>
+              <a:rPr lang="en-US" baseline="0" dirty="0" smtClean="0"/>
+              <a:t> excels at I/O, but you can </a:t>
+            </a:r>
+            <a:r>
+              <a:rPr lang="en-US" i="1" baseline="0" dirty="0" smtClean="0"/>
+              <a:t>treat</a:t>
+            </a:r>
+            <a:r>
+              <a:rPr lang="en-US" baseline="0" dirty="0" smtClean="0"/>
+              <a:t> anything as </a:t>
+            </a:r>
+            <a:r>
+              <a:rPr lang="en-US" baseline="0" dirty="0" err="1" smtClean="0"/>
+              <a:t>async</a:t>
+            </a:r>
+            <a:r>
+              <a:rPr lang="en-US" baseline="0" dirty="0" smtClean="0"/>
+              <a:t>.</a:t>
             </a:r>
             <a:endParaRPr lang="en-US" dirty="0"/>
           </a:p>
@@ -3726,7 +3914,7 @@
           <a:p>
             <a:fld id="{94CE3395-F8FF-4336-B2AA-E15575B990E7}" type="slidenum">
               <a:rPr lang="en-US" smtClean="0"/>
-              <a:t>12</a:t>
+              <a:t>13</a:t>
             </a:fld>
             <a:endParaRPr lang="en-US" dirty="0"/>
           </a:p>
@@ -3735,7 +3923,7 @@
     </p:spTree>
     <p:extLst>
       <p:ext uri="{BB962C8B-B14F-4D97-AF65-F5344CB8AC3E}">
-        <p14:creationId xmlns:p14="http://schemas.microsoft.com/office/powerpoint/2010/main" val="491771487"/>
+        <p14:creationId xmlns:p14="http://schemas.microsoft.com/office/powerpoint/2010/main" val="2170376327"/>
       </p:ext>
     </p:extLst>
   </p:cSld>
@@ -3791,17 +3979,82 @@
           <a:p>
             <a:r>
               <a:rPr lang="en-US" dirty="0" smtClean="0"/>
-              <a:t>Asynchronous processing is all the rage these days. </a:t>
-            </a:r>
+              <a:t>A</a:t>
+            </a:r>
+            <a:r>
+              <a:rPr lang="en-US" baseline="0" dirty="0" smtClean="0"/>
+              <a:t> Task completes exactly once, either successfully (with result) or error.</a:t>
+            </a:r>
+          </a:p>
+          <a:p>
+            <a:endParaRPr lang="en-US" dirty="0" smtClean="0"/>
+          </a:p>
+          <a:p>
+            <a:r>
+              <a:rPr lang="en-US" dirty="0" smtClean="0"/>
+              <a:t>When await is passed an incomplete task, it pauses the current method’s execution and returns an incomplete task.</a:t>
+            </a:r>
+          </a:p>
+          <a:p>
+            <a:r>
+              <a:rPr lang="en-US" dirty="0" smtClean="0"/>
+              <a:t>Pauses the </a:t>
+            </a:r>
+            <a:r>
+              <a:rPr lang="en-US" i="1" dirty="0" smtClean="0"/>
+              <a:t>method</a:t>
+            </a:r>
+            <a:r>
+              <a:rPr lang="en-US" dirty="0" smtClean="0"/>
+              <a:t>,</a:t>
+            </a:r>
+            <a:r>
+              <a:rPr lang="en-US" baseline="0" dirty="0" smtClean="0"/>
+              <a:t> not the </a:t>
+            </a:r>
+            <a:r>
+              <a:rPr lang="en-US" i="1" baseline="0" dirty="0" smtClean="0"/>
+              <a:t>thread</a:t>
+            </a:r>
+            <a:r>
+              <a:rPr lang="en-US" baseline="0" dirty="0" smtClean="0"/>
+              <a:t>.</a:t>
+            </a:r>
+          </a:p>
+          <a:p>
+            <a:r>
+              <a:rPr lang="en-US" baseline="0" dirty="0" smtClean="0"/>
+              <a:t>Later, when the task argument completes, it resumes executing the method (by default, in the same context, or on the thread pool if no context).</a:t>
+            </a:r>
+          </a:p>
+          <a:p>
+            <a:endParaRPr lang="en-US" dirty="0" smtClean="0"/>
+          </a:p>
+          <a:p>
             <a:r>
               <a:rPr lang="en-US" dirty="0" err="1" smtClean="0"/>
               <a:t>Async</a:t>
             </a:r>
             <a:r>
               <a:rPr lang="en-US" dirty="0" smtClean="0"/>
-              <a:t>/await FTW!</a:t>
-            </a:r>
-            <a:endParaRPr lang="en-US" dirty="0"/>
+              <a:t> is about </a:t>
+            </a:r>
+            <a:r>
+              <a:rPr lang="en-US" i="1" dirty="0" smtClean="0"/>
+              <a:t>freeing up </a:t>
+            </a:r>
+            <a:r>
+              <a:rPr lang="en-US" dirty="0" smtClean="0"/>
+              <a:t>the current thread, not using </a:t>
+            </a:r>
+            <a:r>
+              <a:rPr lang="en-US" i="1" dirty="0" smtClean="0"/>
+              <a:t>background</a:t>
+            </a:r>
+            <a:r>
+              <a:rPr lang="en-US" dirty="0" smtClean="0"/>
+              <a:t> threads.</a:t>
+            </a:r>
           </a:p>
         </p:txBody>
       </p:sp>
@@ -3831,7 +4084,7 @@
     </p:spTree>
     <p:extLst>
       <p:ext uri="{BB962C8B-B14F-4D97-AF65-F5344CB8AC3E}">
-        <p14:creationId xmlns:p14="http://schemas.microsoft.com/office/powerpoint/2010/main" val="2170376327"/>
+        <p14:creationId xmlns:p14="http://schemas.microsoft.com/office/powerpoint/2010/main" val="3911491607"/>
       </p:ext>
     </p:extLst>
   </p:cSld>
@@ -11863,12 +12116,8 @@
           <a:lstStyle/>
           <a:p>
             <a:r>
-              <a:rPr lang="en-US" dirty="0" err="1" smtClean="0"/>
-              <a:t>GRDevDay</a:t>
-            </a:r>
-            <a:r>
-              <a:rPr lang="en-US" dirty="0" smtClean="0"/>
-              <a:t> 2014</a:t>
+              <a:rPr lang="en-US" dirty="0" smtClean="0"/>
+              <a:t>NWNUG, 2014-07-15</a:t>
             </a:r>
             <a:endParaRPr lang="en-US" dirty="0"/>
           </a:p>
@@ -12273,131 +12522,6 @@
       </p:grpSpPr>
       <p:sp>
         <p:nvSpPr>
-          <p:cNvPr id="4" name="Title 3"/>
-          <p:cNvSpPr>
-            <a:spLocks noGrp="1"/>
-          </p:cNvSpPr>
-          <p:nvPr>
-            <p:ph type="title"/>
-          </p:nvPr>
-        </p:nvSpPr>
-        <p:spPr/>
-        <p:txBody>
-          <a:bodyPr/>
-          <a:lstStyle/>
-          <a:p>
-            <a:r>
-              <a:rPr lang="en-US" dirty="0" smtClean="0"/>
-              <a:t>Data Parallelism Demos</a:t>
-            </a:r>
-            <a:endParaRPr lang="en-US" dirty="0"/>
-          </a:p>
-        </p:txBody>
-      </p:sp>
-      <p:sp>
-        <p:nvSpPr>
-          <p:cNvPr id="5" name="Text Placeholder 4"/>
-          <p:cNvSpPr>
-            <a:spLocks noGrp="1"/>
-          </p:cNvSpPr>
-          <p:nvPr>
-            <p:ph type="body" sz="quarter" idx="12"/>
-          </p:nvPr>
-        </p:nvSpPr>
-        <p:spPr/>
-        <p:txBody>
-          <a:bodyPr/>
-          <a:lstStyle/>
-          <a:p>
-            <a:r>
-              <a:rPr lang="en-US" dirty="0" smtClean="0"/>
-              <a:t>So you won’t forget, Steve.</a:t>
-            </a:r>
-            <a:endParaRPr lang="en-US" dirty="0"/>
-          </a:p>
-        </p:txBody>
-      </p:sp>
-      <p:pic>
-        <p:nvPicPr>
-          <p:cNvPr id="6" name="Picture 5"/>
-          <p:cNvPicPr>
-            <a:picLocks noChangeAspect="1"/>
-          </p:cNvPicPr>
-          <p:nvPr/>
-        </p:nvPicPr>
-        <p:blipFill>
-          <a:blip r:embed="rId3">
-            <a:extLst>
-              <a:ext uri="{28A0092B-C50C-407E-A947-70E740481C1C}">
-                <a14:useLocalDpi xmlns:a14="http://schemas.microsoft.com/office/drawing/2010/main" val="0"/>
-              </a:ext>
-            </a:extLst>
-          </a:blip>
-          <a:stretch>
-            <a:fillRect/>
-          </a:stretch>
-        </p:blipFill>
-        <p:spPr>
-          <a:xfrm>
-            <a:off x="6211331" y="2535350"/>
-            <a:ext cx="5257675" cy="3507921"/>
-          </a:xfrm>
-          <a:prstGeom prst="rect">
-            <a:avLst/>
-          </a:prstGeom>
-        </p:spPr>
-      </p:pic>
-    </p:spTree>
-    <p:extLst>
-      <p:ext uri="{BB962C8B-B14F-4D97-AF65-F5344CB8AC3E}">
-        <p14:creationId xmlns:p14="http://schemas.microsoft.com/office/powerpoint/2010/main" val="3415530450"/>
-      </p:ext>
-    </p:extLst>
-  </p:cSld>
-  <p:clrMapOvr>
-    <a:masterClrMapping/>
-  </p:clrMapOvr>
-  <mc:AlternateContent xmlns:mc="http://schemas.openxmlformats.org/markup-compatibility/2006">
-    <mc:Choice xmlns:p14="http://schemas.microsoft.com/office/powerpoint/2010/main" Requires="p14">
-      <p:transition spd="med" p14:dur="700">
-        <p:fade/>
-      </p:transition>
-    </mc:Choice>
-    <mc:Fallback>
-      <p:transition spd="med">
-        <p:fade/>
-      </p:transition>
-    </mc:Fallback>
-  </mc:AlternateContent>
-  <p:timing>
-    <p:tnLst>
-      <p:par>
-        <p:cTn id="1" dur="indefinite" restart="never" nodeType="tmRoot"/>
-      </p:par>
-    </p:tnLst>
-  </p:timing>
-</p:sld>
-</file>
-
-<file path=ppt/slides/slide13.xml><?xml version="1.0" encoding="utf-8"?>
-<p:sld xmlns:a="http://schemas.openxmlformats.org/drawingml/2006/main" xmlns:r="http://schemas.openxmlformats.org/officeDocument/2006/relationships" xmlns:p="http://schemas.openxmlformats.org/presentationml/2006/main">
-  <p:cSld>
-    <p:spTree>
-      <p:nvGrpSpPr>
-        <p:cNvPr id="1" name=""/>
-        <p:cNvGrpSpPr/>
-        <p:nvPr/>
-      </p:nvGrpSpPr>
-      <p:grpSpPr>
-        <a:xfrm>
-          <a:off x="0" y="0"/>
-          <a:ext cx="0" cy="0"/>
-          <a:chOff x="0" y="0"/>
-          <a:chExt cx="0" cy="0"/>
-        </a:xfrm>
-      </p:grpSpPr>
-      <p:sp>
-        <p:nvSpPr>
           <p:cNvPr id="6" name="Title 5"/>
           <p:cNvSpPr>
             <a:spLocks noGrp="1"/>
@@ -12442,7 +12566,7 @@
 </p:sld>
 </file>
 
-<file path=ppt/slides/slide14.xml><?xml version="1.0" encoding="utf-8"?>
+<file path=ppt/slides/slide13.xml><?xml version="1.0" encoding="utf-8"?>
 <p:sld xmlns:a="http://schemas.openxmlformats.org/drawingml/2006/main" xmlns:r="http://schemas.openxmlformats.org/officeDocument/2006/relationships" xmlns:p="http://schemas.openxmlformats.org/presentationml/2006/main">
   <p:cSld>
     <p:spTree>
@@ -13037,7 +13161,7 @@
 </p:sld>
 </file>
 
-<file path=ppt/slides/slide15.xml><?xml version="1.0" encoding="utf-8"?>
+<file path=ppt/slides/slide14.xml><?xml version="1.0" encoding="utf-8"?>
 <p:sld xmlns:a="http://schemas.openxmlformats.org/drawingml/2006/main" xmlns:r="http://schemas.openxmlformats.org/officeDocument/2006/relationships" xmlns:p="http://schemas.openxmlformats.org/presentationml/2006/main">
   <p:cSld>
     <p:spTree>
@@ -13297,7 +13421,7 @@
 </p:sld>
 </file>
 
-<file path=ppt/slides/slide16.xml><?xml version="1.0" encoding="utf-8"?>
+<file path=ppt/slides/slide15.xml><?xml version="1.0" encoding="utf-8"?>
 <p:sld xmlns:a="http://schemas.openxmlformats.org/drawingml/2006/main" xmlns:r="http://schemas.openxmlformats.org/officeDocument/2006/relationships" xmlns:p="http://schemas.openxmlformats.org/presentationml/2006/main">
   <p:cSld>
     <p:spTree>
@@ -13430,11 +13554,6 @@
               </a:rPr>
               <a:t>Webster’s Dictionary (1828)</a:t>
             </a:r>
-            <a:endParaRPr lang="en-US" sz="2400" dirty="0" smtClean="0">
-              <a:solidFill>
-                <a:srgbClr val="000000"/>
-              </a:solidFill>
-            </a:endParaRPr>
           </a:p>
         </p:txBody>
       </p:sp>
@@ -13491,7 +13610,7 @@
 </p:sld>
 </file>
 
-<file path=ppt/slides/slide17.xml><?xml version="1.0" encoding="utf-8"?>
+<file path=ppt/slides/slide16.xml><?xml version="1.0" encoding="utf-8"?>
 <p:sld xmlns:a="http://schemas.openxmlformats.org/drawingml/2006/main" xmlns:r="http://schemas.openxmlformats.org/officeDocument/2006/relationships" xmlns:p="http://schemas.openxmlformats.org/presentationml/2006/main">
   <p:cSld>
     <p:spTree>
@@ -14653,6 +14772,149 @@
       <p:bldP spid="28" grpId="0" animBg="1"/>
       <p:bldP spid="29" grpId="0" animBg="1"/>
     </p:bldLst>
+  </p:timing>
+</p:sld>
+</file>
+
+<file path=ppt/slides/slide17.xml><?xml version="1.0" encoding="utf-8"?>
+<p:sld xmlns:a="http://schemas.openxmlformats.org/drawingml/2006/main" xmlns:r="http://schemas.openxmlformats.org/officeDocument/2006/relationships" xmlns:p="http://schemas.openxmlformats.org/presentationml/2006/main">
+  <p:cSld>
+    <p:spTree>
+      <p:nvGrpSpPr>
+        <p:cNvPr id="1" name=""/>
+        <p:cNvGrpSpPr/>
+        <p:nvPr/>
+      </p:nvGrpSpPr>
+      <p:grpSpPr>
+        <a:xfrm>
+          <a:off x="0" y="0"/>
+          <a:ext cx="0" cy="0"/>
+          <a:chOff x="0" y="0"/>
+          <a:chExt cx="0" cy="0"/>
+        </a:xfrm>
+      </p:grpSpPr>
+      <p:sp>
+        <p:nvSpPr>
+          <p:cNvPr id="2" name="Title 1"/>
+          <p:cNvSpPr>
+            <a:spLocks noGrp="1"/>
+          </p:cNvSpPr>
+          <p:nvPr>
+            <p:ph type="title"/>
+          </p:nvPr>
+        </p:nvSpPr>
+        <p:spPr/>
+        <p:txBody>
+          <a:bodyPr/>
+          <a:lstStyle/>
+          <a:p>
+            <a:r>
+              <a:rPr lang="en-US" dirty="0" smtClean="0"/>
+              <a:t>Task: The Great Confusion</a:t>
+            </a:r>
+            <a:endParaRPr lang="en-US" dirty="0"/>
+          </a:p>
+        </p:txBody>
+      </p:sp>
+      <p:sp>
+        <p:nvSpPr>
+          <p:cNvPr id="3" name="Text Placeholder 2"/>
+          <p:cNvSpPr>
+            <a:spLocks noGrp="1"/>
+          </p:cNvSpPr>
+          <p:nvPr>
+            <p:ph type="body" sz="quarter" idx="10"/>
+          </p:nvPr>
+        </p:nvSpPr>
+        <p:spPr>
+          <a:xfrm>
+            <a:off x="269239" y="1197322"/>
+            <a:ext cx="11653522" cy="4466287"/>
+          </a:xfrm>
+        </p:spPr>
+        <p:txBody>
+          <a:bodyPr/>
+          <a:lstStyle/>
+          <a:p>
+            <a:endParaRPr lang="en-US" dirty="0" smtClean="0"/>
+          </a:p>
+          <a:p>
+            <a:r>
+              <a:rPr lang="en-US" dirty="0" smtClean="0"/>
+              <a:t>Promise Tasks</a:t>
+            </a:r>
+          </a:p>
+          <a:p>
+            <a:pPr marL="457200" indent="-457200">
+              <a:buFont typeface="Arial" panose="020B0604020202020204" pitchFamily="34" charset="0"/>
+              <a:buChar char="•"/>
+            </a:pPr>
+            <a:r>
+              <a:rPr lang="en-US" dirty="0" smtClean="0"/>
+              <a:t>Primarily used by Asynchronous code.</a:t>
+            </a:r>
+          </a:p>
+          <a:p>
+            <a:pPr marL="457200" indent="-457200">
+              <a:buFont typeface="Arial" panose="020B0604020202020204" pitchFamily="34" charset="0"/>
+              <a:buChar char="•"/>
+            </a:pPr>
+            <a:r>
+              <a:rPr lang="en-US" dirty="0" smtClean="0"/>
+              <a:t>Represents an event or signal.</a:t>
+            </a:r>
+          </a:p>
+          <a:p>
+            <a:endParaRPr lang="en-US" dirty="0"/>
+          </a:p>
+          <a:p>
+            <a:r>
+              <a:rPr lang="en-US" dirty="0" smtClean="0"/>
+              <a:t>Delegate Tasks</a:t>
+            </a:r>
+          </a:p>
+          <a:p>
+            <a:pPr marL="457200" indent="-457200">
+              <a:buFont typeface="Arial" panose="020B0604020202020204" pitchFamily="34" charset="0"/>
+              <a:buChar char="•"/>
+            </a:pPr>
+            <a:r>
+              <a:rPr lang="en-US" dirty="0" smtClean="0"/>
+              <a:t>Primarily used by Parallel code.</a:t>
+            </a:r>
+          </a:p>
+          <a:p>
+            <a:pPr marL="457200" indent="-457200">
+              <a:buFont typeface="Arial" panose="020B0604020202020204" pitchFamily="34" charset="0"/>
+              <a:buChar char="•"/>
+            </a:pPr>
+            <a:r>
+              <a:rPr lang="en-US" dirty="0" smtClean="0"/>
+              <a:t>Has code (delegate) to run; is scheduled, etc.</a:t>
+            </a:r>
+            <a:endParaRPr lang="en-US" dirty="0"/>
+          </a:p>
+        </p:txBody>
+      </p:sp>
+    </p:spTree>
+    <p:extLst>
+      <p:ext uri="{BB962C8B-B14F-4D97-AF65-F5344CB8AC3E}">
+        <p14:creationId xmlns:p14="http://schemas.microsoft.com/office/powerpoint/2010/main" val="279718920"/>
+      </p:ext>
+    </p:extLst>
+  </p:cSld>
+  <p:clrMapOvr>
+    <a:masterClrMapping/>
+  </p:clrMapOvr>
+  <p:transition>
+    <p:fade/>
+  </p:transition>
+  <p:timing>
+    <p:tnLst>
+      <p:par>
+        <p:cTn id="1" dur="indefinite" restart="never" nodeType="tmRoot"/>
+      </p:par>
+    </p:tnLst>
   </p:timing>
 </p:sld>
 </file>
@@ -19161,6 +19423,131 @@
 </file>
 
 <file path=ppt/slides/slide32.xml><?xml version="1.0" encoding="utf-8"?>
+<p:sld xmlns:a="http://schemas.openxmlformats.org/drawingml/2006/main" xmlns:r="http://schemas.openxmlformats.org/officeDocument/2006/relationships" xmlns:p="http://schemas.openxmlformats.org/presentationml/2006/main">
+  <p:cSld>
+    <p:spTree>
+      <p:nvGrpSpPr>
+        <p:cNvPr id="1" name=""/>
+        <p:cNvGrpSpPr/>
+        <p:nvPr/>
+      </p:nvGrpSpPr>
+      <p:grpSpPr>
+        <a:xfrm>
+          <a:off x="0" y="0"/>
+          <a:ext cx="0" cy="0"/>
+          <a:chOff x="0" y="0"/>
+          <a:chExt cx="0" cy="0"/>
+        </a:xfrm>
+      </p:grpSpPr>
+      <p:sp>
+        <p:nvSpPr>
+          <p:cNvPr id="4" name="Title 3"/>
+          <p:cNvSpPr>
+            <a:spLocks noGrp="1"/>
+          </p:cNvSpPr>
+          <p:nvPr>
+            <p:ph type="title"/>
+          </p:nvPr>
+        </p:nvSpPr>
+        <p:spPr/>
+        <p:txBody>
+          <a:bodyPr/>
+          <a:lstStyle/>
+          <a:p>
+            <a:r>
+              <a:rPr lang="en-US" dirty="0" smtClean="0"/>
+              <a:t>Demos</a:t>
+            </a:r>
+            <a:endParaRPr lang="en-US" dirty="0"/>
+          </a:p>
+        </p:txBody>
+      </p:sp>
+      <p:sp>
+        <p:nvSpPr>
+          <p:cNvPr id="5" name="Text Placeholder 4"/>
+          <p:cNvSpPr>
+            <a:spLocks noGrp="1"/>
+          </p:cNvSpPr>
+          <p:nvPr>
+            <p:ph type="body" sz="quarter" idx="12"/>
+          </p:nvPr>
+        </p:nvSpPr>
+        <p:spPr/>
+        <p:txBody>
+          <a:bodyPr/>
+          <a:lstStyle/>
+          <a:p>
+            <a:r>
+              <a:rPr lang="en-US" dirty="0" smtClean="0"/>
+              <a:t>So you won’t forget, Steve.</a:t>
+            </a:r>
+            <a:endParaRPr lang="en-US" dirty="0"/>
+          </a:p>
+        </p:txBody>
+      </p:sp>
+      <p:pic>
+        <p:nvPicPr>
+          <p:cNvPr id="6" name="Picture 5"/>
+          <p:cNvPicPr>
+            <a:picLocks noChangeAspect="1"/>
+          </p:cNvPicPr>
+          <p:nvPr/>
+        </p:nvPicPr>
+        <p:blipFill>
+          <a:blip r:embed="rId3">
+            <a:extLst>
+              <a:ext uri="{28A0092B-C50C-407E-A947-70E740481C1C}">
+                <a14:useLocalDpi xmlns:a14="http://schemas.microsoft.com/office/drawing/2010/main" val="0"/>
+              </a:ext>
+            </a:extLst>
+          </a:blip>
+          <a:stretch>
+            <a:fillRect/>
+          </a:stretch>
+        </p:blipFill>
+        <p:spPr>
+          <a:xfrm>
+            <a:off x="6211331" y="2535350"/>
+            <a:ext cx="5257675" cy="3507921"/>
+          </a:xfrm>
+          <a:prstGeom prst="rect">
+            <a:avLst/>
+          </a:prstGeom>
+        </p:spPr>
+      </p:pic>
+    </p:spTree>
+    <p:extLst>
+      <p:ext uri="{BB962C8B-B14F-4D97-AF65-F5344CB8AC3E}">
+        <p14:creationId xmlns:p14="http://schemas.microsoft.com/office/powerpoint/2010/main" val="3415530450"/>
+      </p:ext>
+    </p:extLst>
+  </p:cSld>
+  <p:clrMapOvr>
+    <a:masterClrMapping/>
+  </p:clrMapOvr>
+  <mc:AlternateContent xmlns:mc="http://schemas.openxmlformats.org/markup-compatibility/2006" xmlns:p14="http://schemas.microsoft.com/office/powerpoint/2010/main">
+    <mc:Choice Requires="p14">
+      <p:transition spd="med" p14:dur="700">
+        <p:fade/>
+      </p:transition>
+    </mc:Choice>
+    <mc:Fallback xmlns="">
+      <p:transition spd="med">
+        <p:fade/>
+      </p:transition>
+    </mc:Fallback>
+  </mc:AlternateContent>
+  <p:timing>
+    <p:tnLst>
+      <p:par>
+        <p:cTn id="1" dur="indefinite" restart="never" nodeType="tmRoot"/>
+      </p:par>
+    </p:tnLst>
+  </p:timing>
+</p:sld>
+</file>
+
+<file path=ppt/slides/slide33.xml><?xml version="1.0" encoding="utf-8"?>
 <p:sld xmlns:a="http://schemas.openxmlformats.org/drawingml/2006/main" xmlns:r="http://schemas.openxmlformats.org/officeDocument/2006/relationships" xmlns:p="http://schemas.openxmlformats.org/presentationml/2006/main" show="0">
   <p:cSld>
     <p:spTree>
@@ -19253,7 +19640,7 @@
 </p:sld>
 </file>
 
-<file path=ppt/slides/slide33.xml><?xml version="1.0" encoding="utf-8"?>
+<file path=ppt/slides/slide34.xml><?xml version="1.0" encoding="utf-8"?>
 <p:sld xmlns:a="http://schemas.openxmlformats.org/drawingml/2006/main" xmlns:r="http://schemas.openxmlformats.org/officeDocument/2006/relationships" xmlns:p="http://schemas.openxmlformats.org/presentationml/2006/main" show="0">
   <p:cSld>
     <p:spTree>
@@ -19393,7 +19780,7 @@
 </p:sld>
 </file>
 
-<file path=ppt/slides/slide34.xml><?xml version="1.0" encoding="utf-8"?>
+<file path=ppt/slides/slide35.xml><?xml version="1.0" encoding="utf-8"?>
 <p:sld xmlns:a="http://schemas.openxmlformats.org/drawingml/2006/main" xmlns:r="http://schemas.openxmlformats.org/officeDocument/2006/relationships" xmlns:p="http://schemas.openxmlformats.org/presentationml/2006/main" show="0">
   <p:cSld>
     <p:spTree>
@@ -19611,7 +19998,7 @@
 </p:sld>
 </file>
 
-<file path=ppt/slides/slide35.xml><?xml version="1.0" encoding="utf-8"?>
+<file path=ppt/slides/slide36.xml><?xml version="1.0" encoding="utf-8"?>
 <p:sld xmlns:a="http://schemas.openxmlformats.org/drawingml/2006/main" xmlns:r="http://schemas.openxmlformats.org/officeDocument/2006/relationships" xmlns:p="http://schemas.openxmlformats.org/presentationml/2006/main">
   <p:cSld>
     <p:spTree>
@@ -19674,7 +20061,7 @@
 </p:sld>
 </file>
 
-<file path=ppt/slides/slide36.xml><?xml version="1.0" encoding="utf-8"?>
+<file path=ppt/slides/slide37.xml><?xml version="1.0" encoding="utf-8"?>
 <p:sld xmlns:a="http://schemas.openxmlformats.org/drawingml/2006/main" xmlns:r="http://schemas.openxmlformats.org/officeDocument/2006/relationships" xmlns:p="http://schemas.openxmlformats.org/presentationml/2006/main">
   <p:cSld>
     <p:spTree>
@@ -20269,7 +20656,7 @@
 </p:sld>
 </file>
 
-<file path=ppt/slides/slide37.xml><?xml version="1.0" encoding="utf-8"?>
+<file path=ppt/slides/slide38.xml><?xml version="1.0" encoding="utf-8"?>
 <p:sld xmlns:a="http://schemas.openxmlformats.org/drawingml/2006/main" xmlns:r="http://schemas.openxmlformats.org/officeDocument/2006/relationships" xmlns:p="http://schemas.openxmlformats.org/presentationml/2006/main">
   <p:cSld>
     <p:spTree>
@@ -20334,7 +20721,15 @@
           <a:p>
             <a:r>
               <a:rPr lang="en-US" dirty="0" smtClean="0"/>
-              <a:t>Parallel: all built-in to .NET 4.0 and higher, but not WP.</a:t>
+              <a:t>Parallel: all built-in to .NET 4.0 and higher, </a:t>
+            </a:r>
+            <a:r>
+              <a:rPr lang="en-US" strike="sngStrike" dirty="0" smtClean="0"/>
+              <a:t>but not WP</a:t>
+            </a:r>
+            <a:r>
+              <a:rPr lang="en-US" dirty="0" smtClean="0"/>
+              <a:t>.</a:t>
             </a:r>
           </a:p>
           <a:p>
@@ -20456,7 +20851,7 @@
 </p:sld>
 </file>
 
-<file path=ppt/slides/slide38.xml><?xml version="1.0" encoding="utf-8"?>
+<file path=ppt/slides/slide39.xml><?xml version="1.0" encoding="utf-8"?>
 <p:sld xmlns:a="http://schemas.openxmlformats.org/drawingml/2006/main" xmlns:r="http://schemas.openxmlformats.org/officeDocument/2006/relationships" xmlns:p="http://schemas.openxmlformats.org/presentationml/2006/main">
   <p:cSld>
     <p:spTree>
@@ -20670,187 +21065,6 @@
 </p:sld>
 </file>
 
-<file path=ppt/slides/slide39.xml><?xml version="1.0" encoding="utf-8"?>
-<p:sld xmlns:a="http://schemas.openxmlformats.org/drawingml/2006/main" xmlns:r="http://schemas.openxmlformats.org/officeDocument/2006/relationships" xmlns:p="http://schemas.openxmlformats.org/presentationml/2006/main">
-  <p:cSld>
-    <p:spTree>
-      <p:nvGrpSpPr>
-        <p:cNvPr id="1" name=""/>
-        <p:cNvGrpSpPr/>
-        <p:nvPr/>
-      </p:nvGrpSpPr>
-      <p:grpSpPr>
-        <a:xfrm>
-          <a:off x="0" y="0"/>
-          <a:ext cx="0" cy="0"/>
-          <a:chOff x="0" y="0"/>
-          <a:chExt cx="0" cy="0"/>
-        </a:xfrm>
-      </p:grpSpPr>
-      <p:sp>
-        <p:nvSpPr>
-          <p:cNvPr id="3" name="Title 2"/>
-          <p:cNvSpPr>
-            <a:spLocks noGrp="1"/>
-          </p:cNvSpPr>
-          <p:nvPr>
-            <p:ph type="title"/>
-          </p:nvPr>
-        </p:nvSpPr>
-        <p:spPr/>
-        <p:txBody>
-          <a:bodyPr/>
-          <a:lstStyle/>
-          <a:p>
-            <a:r>
-              <a:rPr lang="en-US" dirty="0" smtClean="0"/>
-              <a:t>Where do I go from here?</a:t>
-            </a:r>
-            <a:endParaRPr lang="en-US" dirty="0"/>
-          </a:p>
-        </p:txBody>
-      </p:sp>
-      <p:sp>
-        <p:nvSpPr>
-          <p:cNvPr id="4" name="Text Placeholder 3"/>
-          <p:cNvSpPr>
-            <a:spLocks noGrp="1"/>
-          </p:cNvSpPr>
-          <p:nvPr>
-            <p:ph type="body" sz="quarter" idx="10"/>
-          </p:nvPr>
-        </p:nvSpPr>
-        <p:spPr>
-          <a:xfrm>
-            <a:off x="269239" y="1197322"/>
-            <a:ext cx="11653522" cy="4715137"/>
-          </a:xfrm>
-        </p:spPr>
-        <p:txBody>
-          <a:bodyPr/>
-          <a:lstStyle/>
-          <a:p>
-            <a:endParaRPr lang="en-US" dirty="0" smtClean="0"/>
-          </a:p>
-          <a:p>
-            <a:r>
-              <a:rPr lang="en-US" dirty="0" smtClean="0"/>
-              <a:t>Asynchronous:</a:t>
-            </a:r>
-          </a:p>
-          <a:p>
-            <a:pPr marL="796926" lvl="1" indent="-457200">
-              <a:buFont typeface="Arial" panose="020B0604020202020204" pitchFamily="34" charset="0"/>
-              <a:buChar char="•"/>
-            </a:pPr>
-            <a:r>
-              <a:rPr lang="en-US" dirty="0">
-                <a:hlinkClick r:id="rId3"/>
-              </a:rPr>
-              <a:t>http://</a:t>
-            </a:r>
-            <a:r>
-              <a:rPr lang="en-US" dirty="0" smtClean="0">
-                <a:hlinkClick r:id="rId3"/>
-              </a:rPr>
-              <a:t>blog.stephencleary.com/2012/02/async-and-await.html</a:t>
-            </a:r>
-            <a:r>
-              <a:rPr lang="en-US" dirty="0" smtClean="0"/>
-              <a:t> </a:t>
-            </a:r>
-          </a:p>
-          <a:p>
-            <a:pPr marL="457200" indent="-457200">
-              <a:buFont typeface="Arial" panose="020B0604020202020204" pitchFamily="34" charset="0"/>
-              <a:buChar char="•"/>
-            </a:pPr>
-            <a:endParaRPr lang="en-US" dirty="0"/>
-          </a:p>
-          <a:p>
-            <a:r>
-              <a:rPr lang="en-US" dirty="0" smtClean="0"/>
-              <a:t>TPL Dataflow:</a:t>
-            </a:r>
-          </a:p>
-          <a:p>
-            <a:pPr marL="796926" lvl="1" indent="-457200">
-              <a:buFont typeface="Arial" panose="020B0604020202020204" pitchFamily="34" charset="0"/>
-              <a:buChar char="•"/>
-            </a:pPr>
-            <a:r>
-              <a:rPr lang="en-US" dirty="0">
-                <a:hlinkClick r:id="rId4"/>
-              </a:rPr>
-              <a:t>http://</a:t>
-            </a:r>
-            <a:r>
-              <a:rPr lang="en-US" dirty="0" smtClean="0">
-                <a:hlinkClick r:id="rId4"/>
-              </a:rPr>
-              <a:t>www.microsoft.com/en-us/download/details.aspx?id=14782</a:t>
-            </a:r>
-            <a:r>
-              <a:rPr lang="en-US" dirty="0" smtClean="0"/>
-              <a:t> </a:t>
-            </a:r>
-          </a:p>
-          <a:p>
-            <a:endParaRPr lang="en-US" dirty="0"/>
-          </a:p>
-          <a:p>
-            <a:r>
-              <a:rPr lang="en-US" dirty="0" smtClean="0"/>
-              <a:t>Reactive Extensions:</a:t>
-            </a:r>
-          </a:p>
-          <a:p>
-            <a:pPr marL="796926" lvl="1" indent="-457200">
-              <a:buFont typeface="Arial" panose="020B0604020202020204" pitchFamily="34" charset="0"/>
-              <a:buChar char="•"/>
-            </a:pPr>
-            <a:r>
-              <a:rPr lang="en-US" dirty="0">
-                <a:hlinkClick r:id="rId5"/>
-              </a:rPr>
-              <a:t>http://www.introtorx.com</a:t>
-            </a:r>
-            <a:r>
-              <a:rPr lang="en-US" dirty="0" smtClean="0">
-                <a:hlinkClick r:id="rId5"/>
-              </a:rPr>
-              <a:t>/</a:t>
-            </a:r>
-            <a:r>
-              <a:rPr lang="en-US" dirty="0" smtClean="0"/>
-              <a:t> (Lee Campbell)</a:t>
-            </a:r>
-          </a:p>
-        </p:txBody>
-      </p:sp>
-    </p:spTree>
-    <p:extLst>
-      <p:ext uri="{BB962C8B-B14F-4D97-AF65-F5344CB8AC3E}">
-        <p14:creationId xmlns:p14="http://schemas.microsoft.com/office/powerpoint/2010/main" val="1560678857"/>
-      </p:ext>
-    </p:extLst>
-  </p:cSld>
-  <p:clrMapOvr>
-    <a:masterClrMapping/>
-  </p:clrMapOvr>
-  <p:transition>
-    <p:fade/>
-  </p:transition>
-  <p:timing>
-    <p:tnLst>
-      <p:par>
-        <p:cTn id="1" dur="indefinite" restart="never" nodeType="tmRoot"/>
-      </p:par>
-    </p:tnLst>
-  </p:timing>
-</p:sld>
-</file>
-
 <file path=ppt/slides/slide4.xml><?xml version="1.0" encoding="utf-8"?>
 <p:sld xmlns:a="http://schemas.openxmlformats.org/drawingml/2006/main" xmlns:r="http://schemas.openxmlformats.org/officeDocument/2006/relationships" xmlns:p="http://schemas.openxmlformats.org/presentationml/2006/main">
   <p:cSld>
@@ -20933,6 +21147,187 @@
       </p:grpSpPr>
       <p:sp>
         <p:nvSpPr>
+          <p:cNvPr id="3" name="Title 2"/>
+          <p:cNvSpPr>
+            <a:spLocks noGrp="1"/>
+          </p:cNvSpPr>
+          <p:nvPr>
+            <p:ph type="title"/>
+          </p:nvPr>
+        </p:nvSpPr>
+        <p:spPr/>
+        <p:txBody>
+          <a:bodyPr/>
+          <a:lstStyle/>
+          <a:p>
+            <a:r>
+              <a:rPr lang="en-US" dirty="0" smtClean="0"/>
+              <a:t>Where do I go from here?</a:t>
+            </a:r>
+            <a:endParaRPr lang="en-US" dirty="0"/>
+          </a:p>
+        </p:txBody>
+      </p:sp>
+      <p:sp>
+        <p:nvSpPr>
+          <p:cNvPr id="4" name="Text Placeholder 3"/>
+          <p:cNvSpPr>
+            <a:spLocks noGrp="1"/>
+          </p:cNvSpPr>
+          <p:nvPr>
+            <p:ph type="body" sz="quarter" idx="10"/>
+          </p:nvPr>
+        </p:nvSpPr>
+        <p:spPr>
+          <a:xfrm>
+            <a:off x="269239" y="1197322"/>
+            <a:ext cx="11653522" cy="4715137"/>
+          </a:xfrm>
+        </p:spPr>
+        <p:txBody>
+          <a:bodyPr/>
+          <a:lstStyle/>
+          <a:p>
+            <a:endParaRPr lang="en-US" dirty="0" smtClean="0"/>
+          </a:p>
+          <a:p>
+            <a:r>
+              <a:rPr lang="en-US" dirty="0" smtClean="0"/>
+              <a:t>Asynchronous:</a:t>
+            </a:r>
+          </a:p>
+          <a:p>
+            <a:pPr marL="796926" lvl="1" indent="-457200">
+              <a:buFont typeface="Arial" panose="020B0604020202020204" pitchFamily="34" charset="0"/>
+              <a:buChar char="•"/>
+            </a:pPr>
+            <a:r>
+              <a:rPr lang="en-US" dirty="0">
+                <a:hlinkClick r:id="rId3"/>
+              </a:rPr>
+              <a:t>http://</a:t>
+            </a:r>
+            <a:r>
+              <a:rPr lang="en-US" dirty="0" smtClean="0">
+                <a:hlinkClick r:id="rId3"/>
+              </a:rPr>
+              <a:t>blog.stephencleary.com/2012/02/async-and-await.html</a:t>
+            </a:r>
+            <a:r>
+              <a:rPr lang="en-US" dirty="0" smtClean="0"/>
+              <a:t> </a:t>
+            </a:r>
+          </a:p>
+          <a:p>
+            <a:pPr marL="457200" indent="-457200">
+              <a:buFont typeface="Arial" panose="020B0604020202020204" pitchFamily="34" charset="0"/>
+              <a:buChar char="•"/>
+            </a:pPr>
+            <a:endParaRPr lang="en-US" dirty="0"/>
+          </a:p>
+          <a:p>
+            <a:r>
+              <a:rPr lang="en-US" dirty="0" smtClean="0"/>
+              <a:t>TPL Dataflow:</a:t>
+            </a:r>
+          </a:p>
+          <a:p>
+            <a:pPr marL="796926" lvl="1" indent="-457200">
+              <a:buFont typeface="Arial" panose="020B0604020202020204" pitchFamily="34" charset="0"/>
+              <a:buChar char="•"/>
+            </a:pPr>
+            <a:r>
+              <a:rPr lang="en-US" dirty="0">
+                <a:hlinkClick r:id="rId4"/>
+              </a:rPr>
+              <a:t>http://</a:t>
+            </a:r>
+            <a:r>
+              <a:rPr lang="en-US" dirty="0" smtClean="0">
+                <a:hlinkClick r:id="rId4"/>
+              </a:rPr>
+              <a:t>www.microsoft.com/en-us/download/details.aspx?id=14782</a:t>
+            </a:r>
+            <a:r>
+              <a:rPr lang="en-US" dirty="0" smtClean="0"/>
+              <a:t> </a:t>
+            </a:r>
+          </a:p>
+          <a:p>
+            <a:endParaRPr lang="en-US" dirty="0"/>
+          </a:p>
+          <a:p>
+            <a:r>
+              <a:rPr lang="en-US" dirty="0" smtClean="0"/>
+              <a:t>Reactive Extensions:</a:t>
+            </a:r>
+          </a:p>
+          <a:p>
+            <a:pPr marL="796926" lvl="1" indent="-457200">
+              <a:buFont typeface="Arial" panose="020B0604020202020204" pitchFamily="34" charset="0"/>
+              <a:buChar char="•"/>
+            </a:pPr>
+            <a:r>
+              <a:rPr lang="en-US" dirty="0">
+                <a:hlinkClick r:id="rId5"/>
+              </a:rPr>
+              <a:t>http://www.introtorx.com</a:t>
+            </a:r>
+            <a:r>
+              <a:rPr lang="en-US" dirty="0" smtClean="0">
+                <a:hlinkClick r:id="rId5"/>
+              </a:rPr>
+              <a:t>/</a:t>
+            </a:r>
+            <a:r>
+              <a:rPr lang="en-US" dirty="0" smtClean="0"/>
+              <a:t> (Lee Campbell)</a:t>
+            </a:r>
+          </a:p>
+        </p:txBody>
+      </p:sp>
+    </p:spTree>
+    <p:extLst>
+      <p:ext uri="{BB962C8B-B14F-4D97-AF65-F5344CB8AC3E}">
+        <p14:creationId xmlns:p14="http://schemas.microsoft.com/office/powerpoint/2010/main" val="1560678857"/>
+      </p:ext>
+    </p:extLst>
+  </p:cSld>
+  <p:clrMapOvr>
+    <a:masterClrMapping/>
+  </p:clrMapOvr>
+  <p:transition>
+    <p:fade/>
+  </p:transition>
+  <p:timing>
+    <p:tnLst>
+      <p:par>
+        <p:cTn id="1" dur="indefinite" restart="never" nodeType="tmRoot"/>
+      </p:par>
+    </p:tnLst>
+  </p:timing>
+</p:sld>
+</file>
+
+<file path=ppt/slides/slide41.xml><?xml version="1.0" encoding="utf-8"?>
+<p:sld xmlns:a="http://schemas.openxmlformats.org/drawingml/2006/main" xmlns:r="http://schemas.openxmlformats.org/officeDocument/2006/relationships" xmlns:p="http://schemas.openxmlformats.org/presentationml/2006/main">
+  <p:cSld>
+    <p:spTree>
+      <p:nvGrpSpPr>
+        <p:cNvPr id="1" name=""/>
+        <p:cNvGrpSpPr/>
+        <p:nvPr/>
+      </p:nvGrpSpPr>
+      <p:grpSpPr>
+        <a:xfrm>
+          <a:off x="0" y="0"/>
+          <a:ext cx="0" cy="0"/>
+          <a:chOff x="0" y="0"/>
+          <a:chExt cx="0" cy="0"/>
+        </a:xfrm>
+      </p:grpSpPr>
+      <p:sp>
+        <p:nvSpPr>
           <p:cNvPr id="4" name="Title 3"/>
           <p:cNvSpPr>
             <a:spLocks noGrp="1"/>
@@ -21030,19 +21425,6 @@
               </a:rPr>
               <a:t>Go forth and be awesome!</a:t>
             </a:r>
-            <a:endParaRPr lang="en-US" sz="2400" i="1" dirty="0" smtClean="0">
-              <a:gradFill>
-                <a:gsLst>
-                  <a:gs pos="2917">
-                    <a:schemeClr val="tx1"/>
-                  </a:gs>
-                  <a:gs pos="30000">
-                    <a:schemeClr val="tx1"/>
-                  </a:gs>
-                </a:gsLst>
-                <a:lin ang="5400000" scaled="0"/>
-              </a:gradFill>
-            </a:endParaRPr>
           </a:p>
         </p:txBody>
       </p:sp>
@@ -21116,11 +21498,6 @@
               </a:rPr>
               <a:t>; used with permission</a:t>
             </a:r>
-            <a:endParaRPr lang="en-US" sz="1200" dirty="0" smtClean="0">
-              <a:solidFill>
-                <a:schemeClr val="accent4"/>
-              </a:solidFill>
-            </a:endParaRPr>
           </a:p>
         </p:txBody>
       </p:sp>
@@ -22719,11 +23096,6 @@
               </a:rPr>
               <a:t>X</a:t>
             </a:r>
-            <a:endParaRPr lang="en-US" sz="20000" dirty="0" smtClean="0">
-              <a:solidFill>
-                <a:srgbClr val="FF0000"/>
-              </a:solidFill>
-            </a:endParaRPr>
           </a:p>
         </p:txBody>
       </p:sp>

</xml_diff>

<commit_message>
Hid some less useful Parallel approaches.
</commit_message>
<xml_diff>
--- a/Asynchronous Parallel Reactive - HELP!/Asynchronous Parallel Reactive Help - 16.9.pptx
+++ b/Asynchronous Parallel Reactive - HELP!/Asynchronous Parallel Reactive Help - 16.9.pptx
@@ -13319,7 +13319,7 @@
 </file>
 
 <file path=ppt/slides/slide10.xml><?xml version="1.0" encoding="utf-8"?>
-<p:sld xmlns:a="http://schemas.openxmlformats.org/drawingml/2006/main" xmlns:r="http://schemas.openxmlformats.org/officeDocument/2006/relationships" xmlns:p="http://schemas.openxmlformats.org/presentationml/2006/main">
+<p:sld xmlns:a="http://schemas.openxmlformats.org/drawingml/2006/main" xmlns:r="http://schemas.openxmlformats.org/officeDocument/2006/relationships" xmlns:p="http://schemas.openxmlformats.org/presentationml/2006/main" show="0">
   <p:cSld>
     <p:spTree>
       <p:nvGrpSpPr>
@@ -13459,7 +13459,7 @@
 </file>
 
 <file path=ppt/slides/slide11.xml><?xml version="1.0" encoding="utf-8"?>
-<p:sld xmlns:a="http://schemas.openxmlformats.org/drawingml/2006/main" xmlns:r="http://schemas.openxmlformats.org/officeDocument/2006/relationships" xmlns:p="http://schemas.openxmlformats.org/presentationml/2006/main">
+<p:sld xmlns:a="http://schemas.openxmlformats.org/drawingml/2006/main" xmlns:r="http://schemas.openxmlformats.org/officeDocument/2006/relationships" xmlns:p="http://schemas.openxmlformats.org/presentationml/2006/main" show="0">
   <p:cSld>
     <p:spTree>
       <p:nvGrpSpPr>

</xml_diff>